<commit_message>
slight change to ppt
</commit_message>
<xml_diff>
--- a/grp7_V2.pptx
+++ b/grp7_V2.pptx
@@ -433,11 +433,11 @@
           <c:showBubbleSize val="0"/>
         </c:dLbls>
         <c:smooth val="0"/>
-        <c:axId val="-1204812544"/>
-        <c:axId val="-1220522400"/>
+        <c:axId val="-1221631168"/>
+        <c:axId val="-1221629120"/>
       </c:lineChart>
       <c:catAx>
-        <c:axId val="-1204812544"/>
+        <c:axId val="-1221631168"/>
         <c:scaling>
           <c:orientation val="minMax"/>
         </c:scaling>
@@ -480,7 +480,7 @@
             <a:endParaRPr lang="en-US"/>
           </a:p>
         </c:txPr>
-        <c:crossAx val="-1220522400"/>
+        <c:crossAx val="-1221629120"/>
         <c:crosses val="autoZero"/>
         <c:auto val="1"/>
         <c:lblAlgn val="ctr"/>
@@ -488,7 +488,7 @@
         <c:noMultiLvlLbl val="0"/>
       </c:catAx>
       <c:valAx>
-        <c:axId val="-1220522400"/>
+        <c:axId val="-1221629120"/>
         <c:scaling>
           <c:orientation val="minMax"/>
         </c:scaling>
@@ -525,7 +525,7 @@
             <a:endParaRPr lang="en-US"/>
           </a:p>
         </c:txPr>
-        <c:crossAx val="-1204812544"/>
+        <c:crossAx val="-1221631168"/>
         <c:crosses val="autoZero"/>
         <c:crossBetween val="between"/>
       </c:valAx>
@@ -724,11 +724,11 @@
           <c:showBubbleSize val="0"/>
         </c:dLbls>
         <c:smooth val="0"/>
-        <c:axId val="-1221796608"/>
-        <c:axId val="-1221794288"/>
+        <c:axId val="-1220687312"/>
+        <c:axId val="-1220684992"/>
       </c:lineChart>
       <c:catAx>
-        <c:axId val="-1221796608"/>
+        <c:axId val="-1220687312"/>
         <c:scaling>
           <c:orientation val="minMax"/>
         </c:scaling>
@@ -771,7 +771,7 @@
             <a:endParaRPr lang="en-US"/>
           </a:p>
         </c:txPr>
-        <c:crossAx val="-1221794288"/>
+        <c:crossAx val="-1220684992"/>
         <c:crosses val="autoZero"/>
         <c:auto val="1"/>
         <c:lblAlgn val="ctr"/>
@@ -779,12 +779,13 @@
         <c:noMultiLvlLbl val="0"/>
       </c:catAx>
       <c:valAx>
-        <c:axId val="-1221794288"/>
+        <c:axId val="-1220684992"/>
         <c:scaling>
           <c:orientation val="minMax"/>
         </c:scaling>
         <c:delete val="0"/>
         <c:axPos val="l"/>
+        <c:numFmt formatCode="General" sourceLinked="0"/>
         <c:majorTickMark val="none"/>
         <c:minorTickMark val="none"/>
         <c:tickLblPos val="nextTo"/>
@@ -815,7 +816,7 @@
             <a:endParaRPr lang="en-US"/>
           </a:p>
         </c:txPr>
-        <c:crossAx val="-1221796608"/>
+        <c:crossAx val="-1220687312"/>
         <c:crosses val="autoZero"/>
         <c:crossBetween val="between"/>
       </c:valAx>
@@ -1121,11 +1122,11 @@
           <c:showBubbleSize val="0"/>
         </c:dLbls>
         <c:smooth val="0"/>
-        <c:axId val="-1293088736"/>
-        <c:axId val="-1219428848"/>
+        <c:axId val="-1221766496"/>
+        <c:axId val="-1221773216"/>
       </c:lineChart>
       <c:catAx>
-        <c:axId val="-1293088736"/>
+        <c:axId val="-1221766496"/>
         <c:scaling>
           <c:orientation val="minMax"/>
         </c:scaling>
@@ -1168,7 +1169,7 @@
             <a:endParaRPr lang="en-US"/>
           </a:p>
         </c:txPr>
-        <c:crossAx val="-1219428848"/>
+        <c:crossAx val="-1221773216"/>
         <c:crosses val="autoZero"/>
         <c:auto val="1"/>
         <c:lblAlgn val="ctr"/>
@@ -1176,12 +1177,13 @@
         <c:noMultiLvlLbl val="0"/>
       </c:catAx>
       <c:valAx>
-        <c:axId val="-1219428848"/>
+        <c:axId val="-1221773216"/>
         <c:scaling>
           <c:orientation val="minMax"/>
         </c:scaling>
         <c:delete val="0"/>
         <c:axPos val="l"/>
+        <c:numFmt formatCode="0.0" sourceLinked="0"/>
         <c:majorTickMark val="none"/>
         <c:minorTickMark val="none"/>
         <c:tickLblPos val="nextTo"/>
@@ -1212,7 +1214,7 @@
             <a:endParaRPr lang="en-US"/>
           </a:p>
         </c:txPr>
-        <c:crossAx val="-1293088736"/>
+        <c:crossAx val="-1221766496"/>
         <c:crosses val="autoZero"/>
         <c:crossBetween val="between"/>
       </c:valAx>
@@ -1545,11 +1547,11 @@
           <c:showBubbleSize val="0"/>
         </c:dLbls>
         <c:smooth val="0"/>
-        <c:axId val="-1221823248"/>
-        <c:axId val="-1221867072"/>
+        <c:axId val="-1221804032"/>
+        <c:axId val="-1221801712"/>
       </c:lineChart>
       <c:catAx>
-        <c:axId val="-1221823248"/>
+        <c:axId val="-1221804032"/>
         <c:scaling>
           <c:orientation val="minMax"/>
         </c:scaling>
@@ -1592,7 +1594,7 @@
             <a:endParaRPr lang="en-US"/>
           </a:p>
         </c:txPr>
-        <c:crossAx val="-1221867072"/>
+        <c:crossAx val="-1221801712"/>
         <c:crosses val="autoZero"/>
         <c:auto val="1"/>
         <c:lblAlgn val="ctr"/>
@@ -1600,7 +1602,7 @@
         <c:noMultiLvlLbl val="0"/>
       </c:catAx>
       <c:valAx>
-        <c:axId val="-1221867072"/>
+        <c:axId val="-1221801712"/>
         <c:scaling>
           <c:orientation val="minMax"/>
         </c:scaling>
@@ -1637,7 +1639,7 @@
             <a:endParaRPr lang="en-US"/>
           </a:p>
         </c:txPr>
-        <c:crossAx val="-1221823248"/>
+        <c:crossAx val="-1221804032"/>
         <c:crosses val="autoZero"/>
         <c:crossBetween val="between"/>
       </c:valAx>
@@ -1867,11 +1869,11 @@
           <c:showBubbleSize val="0"/>
         </c:dLbls>
         <c:smooth val="0"/>
-        <c:axId val="-1217555184"/>
-        <c:axId val="-1217821328"/>
+        <c:axId val="-1221617728"/>
+        <c:axId val="-1221634800"/>
       </c:lineChart>
       <c:catAx>
-        <c:axId val="-1217555184"/>
+        <c:axId val="-1221617728"/>
         <c:scaling>
           <c:orientation val="minMax"/>
         </c:scaling>
@@ -1914,7 +1916,7 @@
             <a:endParaRPr lang="en-US"/>
           </a:p>
         </c:txPr>
-        <c:crossAx val="-1217821328"/>
+        <c:crossAx val="-1221634800"/>
         <c:crosses val="autoZero"/>
         <c:auto val="1"/>
         <c:lblAlgn val="ctr"/>
@@ -1922,12 +1924,13 @@
         <c:noMultiLvlLbl val="0"/>
       </c:catAx>
       <c:valAx>
-        <c:axId val="-1217821328"/>
+        <c:axId val="-1221634800"/>
         <c:scaling>
           <c:orientation val="minMax"/>
         </c:scaling>
         <c:delete val="0"/>
         <c:axPos val="l"/>
+        <c:numFmt formatCode="General" sourceLinked="0"/>
         <c:majorTickMark val="none"/>
         <c:minorTickMark val="none"/>
         <c:tickLblPos val="nextTo"/>
@@ -1958,7 +1961,7 @@
             <a:endParaRPr lang="en-US"/>
           </a:p>
         </c:txPr>
-        <c:crossAx val="-1217555184"/>
+        <c:crossAx val="-1221617728"/>
         <c:crosses val="autoZero"/>
         <c:crossBetween val="between"/>
       </c:valAx>
@@ -2157,11 +2160,11 @@
           <c:showBubbleSize val="0"/>
         </c:dLbls>
         <c:smooth val="0"/>
-        <c:axId val="-1204076992"/>
-        <c:axId val="-1219835456"/>
+        <c:axId val="-1204055680"/>
+        <c:axId val="-1219538064"/>
       </c:lineChart>
       <c:catAx>
-        <c:axId val="-1204076992"/>
+        <c:axId val="-1204055680"/>
         <c:scaling>
           <c:orientation val="minMax"/>
         </c:scaling>
@@ -2204,7 +2207,7 @@
             <a:endParaRPr lang="en-US"/>
           </a:p>
         </c:txPr>
-        <c:crossAx val="-1219835456"/>
+        <c:crossAx val="-1219538064"/>
         <c:crosses val="autoZero"/>
         <c:auto val="1"/>
         <c:lblAlgn val="ctr"/>
@@ -2212,7 +2215,7 @@
         <c:noMultiLvlLbl val="0"/>
       </c:catAx>
       <c:valAx>
-        <c:axId val="-1219835456"/>
+        <c:axId val="-1219538064"/>
         <c:scaling>
           <c:orientation val="minMax"/>
         </c:scaling>
@@ -2248,7 +2251,7 @@
             <a:endParaRPr lang="en-US"/>
           </a:p>
         </c:txPr>
-        <c:crossAx val="-1204076992"/>
+        <c:crossAx val="-1204055680"/>
         <c:crosses val="autoZero"/>
         <c:crossBetween val="between"/>
       </c:valAx>
@@ -2447,11 +2450,11 @@
           <c:showBubbleSize val="0"/>
         </c:dLbls>
         <c:smooth val="0"/>
-        <c:axId val="-1204206896"/>
-        <c:axId val="-1204204576"/>
+        <c:axId val="-1219589712"/>
+        <c:axId val="-1219587664"/>
       </c:lineChart>
       <c:catAx>
-        <c:axId val="-1204206896"/>
+        <c:axId val="-1219589712"/>
         <c:scaling>
           <c:orientation val="minMax"/>
         </c:scaling>
@@ -2494,7 +2497,7 @@
             <a:endParaRPr lang="en-US"/>
           </a:p>
         </c:txPr>
-        <c:crossAx val="-1204204576"/>
+        <c:crossAx val="-1219587664"/>
         <c:crosses val="autoZero"/>
         <c:auto val="1"/>
         <c:lblAlgn val="ctr"/>
@@ -2502,7 +2505,7 @@
         <c:noMultiLvlLbl val="0"/>
       </c:catAx>
       <c:valAx>
-        <c:axId val="-1204204576"/>
+        <c:axId val="-1219587664"/>
         <c:scaling>
           <c:orientation val="minMax"/>
         </c:scaling>
@@ -2539,7 +2542,7 @@
             <a:endParaRPr lang="en-US"/>
           </a:p>
         </c:txPr>
-        <c:crossAx val="-1204206896"/>
+        <c:crossAx val="-1219589712"/>
         <c:crosses val="autoZero"/>
         <c:crossBetween val="between"/>
       </c:valAx>
@@ -2738,11 +2741,11 @@
           <c:showBubbleSize val="0"/>
         </c:dLbls>
         <c:smooth val="0"/>
-        <c:axId val="-1256762992"/>
-        <c:axId val="-1256760944"/>
+        <c:axId val="-1220600112"/>
+        <c:axId val="-1220597792"/>
       </c:lineChart>
       <c:catAx>
-        <c:axId val="-1256762992"/>
+        <c:axId val="-1220600112"/>
         <c:scaling>
           <c:orientation val="minMax"/>
         </c:scaling>
@@ -2785,7 +2788,7 @@
             <a:endParaRPr lang="en-US"/>
           </a:p>
         </c:txPr>
-        <c:crossAx val="-1256760944"/>
+        <c:crossAx val="-1220597792"/>
         <c:crosses val="autoZero"/>
         <c:auto val="1"/>
         <c:lblAlgn val="ctr"/>
@@ -2793,7 +2796,7 @@
         <c:noMultiLvlLbl val="0"/>
       </c:catAx>
       <c:valAx>
-        <c:axId val="-1256760944"/>
+        <c:axId val="-1220597792"/>
         <c:scaling>
           <c:orientation val="minMax"/>
         </c:scaling>
@@ -2830,7 +2833,7 @@
             <a:endParaRPr lang="en-US"/>
           </a:p>
         </c:txPr>
-        <c:crossAx val="-1256762992"/>
+        <c:crossAx val="-1220600112"/>
         <c:crosses val="autoZero"/>
         <c:crossBetween val="between"/>
       </c:valAx>
@@ -3029,11 +3032,11 @@
           <c:showBubbleSize val="0"/>
         </c:dLbls>
         <c:smooth val="0"/>
-        <c:axId val="-1292080848"/>
-        <c:axId val="-1292078528"/>
+        <c:axId val="-1220576336"/>
+        <c:axId val="-1220574016"/>
       </c:lineChart>
       <c:catAx>
-        <c:axId val="-1292080848"/>
+        <c:axId val="-1220576336"/>
         <c:scaling>
           <c:orientation val="minMax"/>
         </c:scaling>
@@ -3076,7 +3079,7 @@
             <a:endParaRPr lang="en-US"/>
           </a:p>
         </c:txPr>
-        <c:crossAx val="-1292078528"/>
+        <c:crossAx val="-1220574016"/>
         <c:crosses val="autoZero"/>
         <c:auto val="1"/>
         <c:lblAlgn val="ctr"/>
@@ -3084,7 +3087,7 @@
         <c:noMultiLvlLbl val="0"/>
       </c:catAx>
       <c:valAx>
-        <c:axId val="-1292078528"/>
+        <c:axId val="-1220574016"/>
         <c:scaling>
           <c:orientation val="minMax"/>
         </c:scaling>
@@ -3120,7 +3123,7 @@
             <a:endParaRPr lang="en-US"/>
           </a:p>
         </c:txPr>
-        <c:crossAx val="-1292080848"/>
+        <c:crossAx val="-1220576336"/>
         <c:crosses val="autoZero"/>
         <c:crossBetween val="between"/>
       </c:valAx>
@@ -3315,11 +3318,11 @@
           <c:showBubbleSize val="0"/>
         </c:dLbls>
         <c:smooth val="0"/>
-        <c:axId val="-1221650864"/>
-        <c:axId val="-1221648544"/>
+        <c:axId val="-1221695024"/>
+        <c:axId val="-1221702464"/>
       </c:lineChart>
       <c:catAx>
-        <c:axId val="-1221650864"/>
+        <c:axId val="-1221695024"/>
         <c:scaling>
           <c:orientation val="minMax"/>
         </c:scaling>
@@ -3362,7 +3365,7 @@
             <a:endParaRPr lang="en-US"/>
           </a:p>
         </c:txPr>
-        <c:crossAx val="-1221648544"/>
+        <c:crossAx val="-1221702464"/>
         <c:crosses val="autoZero"/>
         <c:auto val="1"/>
         <c:lblAlgn val="ctr"/>
@@ -3370,7 +3373,7 @@
         <c:noMultiLvlLbl val="0"/>
       </c:catAx>
       <c:valAx>
-        <c:axId val="-1221648544"/>
+        <c:axId val="-1221702464"/>
         <c:scaling>
           <c:orientation val="minMax"/>
         </c:scaling>
@@ -3407,7 +3410,7 @@
             <a:endParaRPr lang="en-US"/>
           </a:p>
         </c:txPr>
-        <c:crossAx val="-1221650864"/>
+        <c:crossAx val="-1221695024"/>
         <c:crosses val="autoZero"/>
         <c:crossBetween val="between"/>
       </c:valAx>
@@ -3602,11 +3605,11 @@
           <c:showBubbleSize val="0"/>
         </c:dLbls>
         <c:smooth val="0"/>
-        <c:axId val="-1221702048"/>
-        <c:axId val="-1221699728"/>
+        <c:axId val="-1220560736"/>
+        <c:axId val="-1220628976"/>
       </c:lineChart>
       <c:catAx>
-        <c:axId val="-1221702048"/>
+        <c:axId val="-1220560736"/>
         <c:scaling>
           <c:orientation val="minMax"/>
         </c:scaling>
@@ -3649,7 +3652,7 @@
             <a:endParaRPr lang="en-US"/>
           </a:p>
         </c:txPr>
-        <c:crossAx val="-1221699728"/>
+        <c:crossAx val="-1220628976"/>
         <c:crosses val="autoZero"/>
         <c:auto val="1"/>
         <c:lblAlgn val="ctr"/>
@@ -3657,7 +3660,7 @@
         <c:noMultiLvlLbl val="0"/>
       </c:catAx>
       <c:valAx>
-        <c:axId val="-1221699728"/>
+        <c:axId val="-1220628976"/>
         <c:scaling>
           <c:orientation val="minMax"/>
         </c:scaling>
@@ -3693,7 +3696,7 @@
             <a:endParaRPr lang="en-US"/>
           </a:p>
         </c:txPr>
-        <c:crossAx val="-1221702048"/>
+        <c:crossAx val="-1220560736"/>
         <c:crosses val="autoZero"/>
         <c:crossBetween val="between"/>
       </c:valAx>
@@ -3892,11 +3895,11 @@
           <c:showBubbleSize val="0"/>
         </c:dLbls>
         <c:smooth val="0"/>
-        <c:axId val="-1221740592"/>
-        <c:axId val="-1221738272"/>
+        <c:axId val="-1220715360"/>
+        <c:axId val="-1220713040"/>
       </c:lineChart>
       <c:catAx>
-        <c:axId val="-1221740592"/>
+        <c:axId val="-1220715360"/>
         <c:scaling>
           <c:orientation val="minMax"/>
         </c:scaling>
@@ -3939,7 +3942,7 @@
             <a:endParaRPr lang="en-US"/>
           </a:p>
         </c:txPr>
-        <c:crossAx val="-1221738272"/>
+        <c:crossAx val="-1220713040"/>
         <c:crosses val="autoZero"/>
         <c:auto val="1"/>
         <c:lblAlgn val="ctr"/>
@@ -3947,7 +3950,7 @@
         <c:noMultiLvlLbl val="0"/>
       </c:catAx>
       <c:valAx>
-        <c:axId val="-1221738272"/>
+        <c:axId val="-1220713040"/>
         <c:scaling>
           <c:orientation val="minMax"/>
         </c:scaling>
@@ -3984,7 +3987,7 @@
             <a:endParaRPr lang="en-US"/>
           </a:p>
         </c:txPr>
-        <c:crossAx val="-1221740592"/>
+        <c:crossAx val="-1220715360"/>
         <c:crosses val="autoZero"/>
         <c:crossBetween val="between"/>
       </c:valAx>
@@ -26155,7 +26158,7 @@
           <p:cNvPr id="13" name="Content Placeholder 2">
             <a:extLst>
               <a:ext uri="{FF2B5EF4-FFF2-40B4-BE49-F238E27FC236}">
-                <a16:creationId xmlns:a16="http://schemas.microsoft.com/office/drawing/2014/main" xmlns="" id="{7CE76DCB-6D06-4FCF-8C85-021414B0A6EA}"/>
+                <a16:creationId xmlns="" xmlns:a16="http://schemas.microsoft.com/office/drawing/2014/main" id="{7CE76DCB-6D06-4FCF-8C85-021414B0A6EA}"/>
               </a:ext>
             </a:extLst>
           </p:cNvPr>
@@ -26530,7 +26533,7 @@
           <p:cNvPr id="6" name="Content Placeholder 2">
             <a:extLst>
               <a:ext uri="{FF2B5EF4-FFF2-40B4-BE49-F238E27FC236}">
-                <a16:creationId xmlns="" xmlns:a16="http://schemas.microsoft.com/office/drawing/2014/main" id="{7CE76DCB-6D06-4FCF-8C85-021414B0A6EA}"/>
+                <a16:creationId xmlns:a16="http://schemas.microsoft.com/office/drawing/2014/main" xmlns="" id="{7CE76DCB-6D06-4FCF-8C85-021414B0A6EA}"/>
               </a:ext>
             </a:extLst>
           </p:cNvPr>
@@ -29386,7 +29389,7 @@
           <p:cNvPr id="10" name="Content Placeholder 2">
             <a:extLst>
               <a:ext uri="{FF2B5EF4-FFF2-40B4-BE49-F238E27FC236}">
-                <a16:creationId xmlns:a16="http://schemas.microsoft.com/office/drawing/2014/main" xmlns="" id="{7CE76DCB-6D06-4FCF-8C85-021414B0A6EA}"/>
+                <a16:creationId xmlns="" xmlns:a16="http://schemas.microsoft.com/office/drawing/2014/main" id="{7CE76DCB-6D06-4FCF-8C85-021414B0A6EA}"/>
               </a:ext>
             </a:extLst>
           </p:cNvPr>
@@ -29670,7 +29673,7 @@
           <p:cNvPr id="11" name="Content Placeholder 2">
             <a:extLst>
               <a:ext uri="{FF2B5EF4-FFF2-40B4-BE49-F238E27FC236}">
-                <a16:creationId xmlns:a16="http://schemas.microsoft.com/office/drawing/2014/main" xmlns="" id="{7CE76DCB-6D06-4FCF-8C85-021414B0A6EA}"/>
+                <a16:creationId xmlns="" xmlns:a16="http://schemas.microsoft.com/office/drawing/2014/main" id="{7CE76DCB-6D06-4FCF-8C85-021414B0A6EA}"/>
               </a:ext>
             </a:extLst>
           </p:cNvPr>
@@ -29904,7 +29907,31 @@
                 <a:ea typeface="Book Antiqua" charset="0"/>
                 <a:cs typeface="Book Antiqua" charset="0"/>
               </a:rPr>
-              <a:t> Running time cost on Test data</a:t>
+              <a:t> </a:t>
+            </a:r>
+            <a:r>
+              <a:rPr lang="en-US" sz="2400" smtClean="0">
+                <a:latin typeface="Book Antiqua" charset="0"/>
+                <a:ea typeface="Book Antiqua" charset="0"/>
+                <a:cs typeface="Book Antiqua" charset="0"/>
+              </a:rPr>
+              <a:t>Running </a:t>
+            </a:r>
+            <a:r>
+              <a:rPr lang="en-US" sz="2400" smtClean="0">
+                <a:latin typeface="Book Antiqua" charset="0"/>
+                <a:ea typeface="Book Antiqua" charset="0"/>
+                <a:cs typeface="Book Antiqua" charset="0"/>
+              </a:rPr>
+              <a:t>time on </a:t>
+            </a:r>
+            <a:r>
+              <a:rPr lang="en-US" sz="2400" dirty="0" smtClean="0">
+                <a:latin typeface="Book Antiqua" charset="0"/>
+                <a:ea typeface="Book Antiqua" charset="0"/>
+                <a:cs typeface="Book Antiqua" charset="0"/>
+              </a:rPr>
+              <a:t>Test data</a:t>
             </a:r>
             <a:endParaRPr lang="en-US" sz="2400" dirty="0">
               <a:latin typeface="Book Antiqua" charset="0"/>

</xml_diff>

<commit_message>
change in CV error rate
</commit_message>
<xml_diff>
--- a/grp7_V2.pptx
+++ b/grp7_V2.pptx
@@ -433,11 +433,11 @@
           <c:showBubbleSize val="0"/>
         </c:dLbls>
         <c:smooth val="0"/>
-        <c:axId val="-1221631168"/>
-        <c:axId val="-1221629120"/>
+        <c:axId val="-1217916032"/>
+        <c:axId val="-1222451568"/>
       </c:lineChart>
       <c:catAx>
-        <c:axId val="-1221631168"/>
+        <c:axId val="-1217916032"/>
         <c:scaling>
           <c:orientation val="minMax"/>
         </c:scaling>
@@ -480,7 +480,7 @@
             <a:endParaRPr lang="en-US"/>
           </a:p>
         </c:txPr>
-        <c:crossAx val="-1221629120"/>
+        <c:crossAx val="-1222451568"/>
         <c:crosses val="autoZero"/>
         <c:auto val="1"/>
         <c:lblAlgn val="ctr"/>
@@ -488,7 +488,7 @@
         <c:noMultiLvlLbl val="0"/>
       </c:catAx>
       <c:valAx>
-        <c:axId val="-1221629120"/>
+        <c:axId val="-1222451568"/>
         <c:scaling>
           <c:orientation val="minMax"/>
         </c:scaling>
@@ -525,7 +525,7 @@
             <a:endParaRPr lang="en-US"/>
           </a:p>
         </c:txPr>
-        <c:crossAx val="-1221631168"/>
+        <c:crossAx val="-1217916032"/>
         <c:crosses val="autoZero"/>
         <c:crossBetween val="between"/>
       </c:valAx>
@@ -724,11 +724,11 @@
           <c:showBubbleSize val="0"/>
         </c:dLbls>
         <c:smooth val="0"/>
-        <c:axId val="-1220687312"/>
-        <c:axId val="-1220684992"/>
+        <c:axId val="-1222329760"/>
+        <c:axId val="-1222327440"/>
       </c:lineChart>
       <c:catAx>
-        <c:axId val="-1220687312"/>
+        <c:axId val="-1222329760"/>
         <c:scaling>
           <c:orientation val="minMax"/>
         </c:scaling>
@@ -771,7 +771,7 @@
             <a:endParaRPr lang="en-US"/>
           </a:p>
         </c:txPr>
-        <c:crossAx val="-1220684992"/>
+        <c:crossAx val="-1222327440"/>
         <c:crosses val="autoZero"/>
         <c:auto val="1"/>
         <c:lblAlgn val="ctr"/>
@@ -779,7 +779,7 @@
         <c:noMultiLvlLbl val="0"/>
       </c:catAx>
       <c:valAx>
-        <c:axId val="-1220684992"/>
+        <c:axId val="-1222327440"/>
         <c:scaling>
           <c:orientation val="minMax"/>
         </c:scaling>
@@ -816,7 +816,7 @@
             <a:endParaRPr lang="en-US"/>
           </a:p>
         </c:txPr>
-        <c:crossAx val="-1220687312"/>
+        <c:crossAx val="-1222329760"/>
         <c:crosses val="autoZero"/>
         <c:crossBetween val="between"/>
       </c:valAx>
@@ -1122,11 +1122,11 @@
           <c:showBubbleSize val="0"/>
         </c:dLbls>
         <c:smooth val="0"/>
-        <c:axId val="-1221766496"/>
-        <c:axId val="-1221773216"/>
+        <c:axId val="-1217668032"/>
+        <c:axId val="-1217665984"/>
       </c:lineChart>
       <c:catAx>
-        <c:axId val="-1221766496"/>
+        <c:axId val="-1217668032"/>
         <c:scaling>
           <c:orientation val="minMax"/>
         </c:scaling>
@@ -1169,7 +1169,7 @@
             <a:endParaRPr lang="en-US"/>
           </a:p>
         </c:txPr>
-        <c:crossAx val="-1221773216"/>
+        <c:crossAx val="-1217665984"/>
         <c:crosses val="autoZero"/>
         <c:auto val="1"/>
         <c:lblAlgn val="ctr"/>
@@ -1177,7 +1177,7 @@
         <c:noMultiLvlLbl val="0"/>
       </c:catAx>
       <c:valAx>
-        <c:axId val="-1221773216"/>
+        <c:axId val="-1217665984"/>
         <c:scaling>
           <c:orientation val="minMax"/>
         </c:scaling>
@@ -1214,7 +1214,7 @@
             <a:endParaRPr lang="en-US"/>
           </a:p>
         </c:txPr>
-        <c:crossAx val="-1221766496"/>
+        <c:crossAx val="-1217668032"/>
         <c:crosses val="autoZero"/>
         <c:crossBetween val="between"/>
       </c:valAx>
@@ -1547,11 +1547,11 @@
           <c:showBubbleSize val="0"/>
         </c:dLbls>
         <c:smooth val="0"/>
-        <c:axId val="-1221804032"/>
-        <c:axId val="-1221801712"/>
+        <c:axId val="-1292945552"/>
+        <c:axId val="-1293619040"/>
       </c:lineChart>
       <c:catAx>
-        <c:axId val="-1221804032"/>
+        <c:axId val="-1292945552"/>
         <c:scaling>
           <c:orientation val="minMax"/>
         </c:scaling>
@@ -1594,7 +1594,7 @@
             <a:endParaRPr lang="en-US"/>
           </a:p>
         </c:txPr>
-        <c:crossAx val="-1221801712"/>
+        <c:crossAx val="-1293619040"/>
         <c:crosses val="autoZero"/>
         <c:auto val="1"/>
         <c:lblAlgn val="ctr"/>
@@ -1602,7 +1602,7 @@
         <c:noMultiLvlLbl val="0"/>
       </c:catAx>
       <c:valAx>
-        <c:axId val="-1221801712"/>
+        <c:axId val="-1293619040"/>
         <c:scaling>
           <c:orientation val="minMax"/>
         </c:scaling>
@@ -1639,7 +1639,7 @@
             <a:endParaRPr lang="en-US"/>
           </a:p>
         </c:txPr>
-        <c:crossAx val="-1221804032"/>
+        <c:crossAx val="-1292945552"/>
         <c:crosses val="autoZero"/>
         <c:crossBetween val="between"/>
       </c:valAx>
@@ -1869,11 +1869,11 @@
           <c:showBubbleSize val="0"/>
         </c:dLbls>
         <c:smooth val="0"/>
-        <c:axId val="-1221617728"/>
-        <c:axId val="-1221634800"/>
+        <c:axId val="-1219362768"/>
+        <c:axId val="-1219360448"/>
       </c:lineChart>
       <c:catAx>
-        <c:axId val="-1221617728"/>
+        <c:axId val="-1219362768"/>
         <c:scaling>
           <c:orientation val="minMax"/>
         </c:scaling>
@@ -1916,7 +1916,7 @@
             <a:endParaRPr lang="en-US"/>
           </a:p>
         </c:txPr>
-        <c:crossAx val="-1221634800"/>
+        <c:crossAx val="-1219360448"/>
         <c:crosses val="autoZero"/>
         <c:auto val="1"/>
         <c:lblAlgn val="ctr"/>
@@ -1924,7 +1924,7 @@
         <c:noMultiLvlLbl val="0"/>
       </c:catAx>
       <c:valAx>
-        <c:axId val="-1221634800"/>
+        <c:axId val="-1219360448"/>
         <c:scaling>
           <c:orientation val="minMax"/>
         </c:scaling>
@@ -1961,7 +1961,7 @@
             <a:endParaRPr lang="en-US"/>
           </a:p>
         </c:txPr>
-        <c:crossAx val="-1221617728"/>
+        <c:crossAx val="-1219362768"/>
         <c:crosses val="autoZero"/>
         <c:crossBetween val="between"/>
       </c:valAx>
@@ -2160,11 +2160,11 @@
           <c:showBubbleSize val="0"/>
         </c:dLbls>
         <c:smooth val="0"/>
-        <c:axId val="-1204055680"/>
-        <c:axId val="-1219538064"/>
+        <c:axId val="-1221865040"/>
+        <c:axId val="-1221855584"/>
       </c:lineChart>
       <c:catAx>
-        <c:axId val="-1204055680"/>
+        <c:axId val="-1221865040"/>
         <c:scaling>
           <c:orientation val="minMax"/>
         </c:scaling>
@@ -2207,7 +2207,7 @@
             <a:endParaRPr lang="en-US"/>
           </a:p>
         </c:txPr>
-        <c:crossAx val="-1219538064"/>
+        <c:crossAx val="-1221855584"/>
         <c:crosses val="autoZero"/>
         <c:auto val="1"/>
         <c:lblAlgn val="ctr"/>
@@ -2215,7 +2215,7 @@
         <c:noMultiLvlLbl val="0"/>
       </c:catAx>
       <c:valAx>
-        <c:axId val="-1219538064"/>
+        <c:axId val="-1221855584"/>
         <c:scaling>
           <c:orientation val="minMax"/>
         </c:scaling>
@@ -2251,7 +2251,7 @@
             <a:endParaRPr lang="en-US"/>
           </a:p>
         </c:txPr>
-        <c:crossAx val="-1204055680"/>
+        <c:crossAx val="-1221865040"/>
         <c:crosses val="autoZero"/>
         <c:crossBetween val="between"/>
       </c:valAx>
@@ -2450,11 +2450,11 @@
           <c:showBubbleSize val="0"/>
         </c:dLbls>
         <c:smooth val="0"/>
-        <c:axId val="-1219589712"/>
-        <c:axId val="-1219587664"/>
+        <c:axId val="-1295418592"/>
+        <c:axId val="-1222119088"/>
       </c:lineChart>
       <c:catAx>
-        <c:axId val="-1219589712"/>
+        <c:axId val="-1295418592"/>
         <c:scaling>
           <c:orientation val="minMax"/>
         </c:scaling>
@@ -2497,7 +2497,7 @@
             <a:endParaRPr lang="en-US"/>
           </a:p>
         </c:txPr>
-        <c:crossAx val="-1219587664"/>
+        <c:crossAx val="-1222119088"/>
         <c:crosses val="autoZero"/>
         <c:auto val="1"/>
         <c:lblAlgn val="ctr"/>
@@ -2505,7 +2505,7 @@
         <c:noMultiLvlLbl val="0"/>
       </c:catAx>
       <c:valAx>
-        <c:axId val="-1219587664"/>
+        <c:axId val="-1222119088"/>
         <c:scaling>
           <c:orientation val="minMax"/>
         </c:scaling>
@@ -2542,7 +2542,7 @@
             <a:endParaRPr lang="en-US"/>
           </a:p>
         </c:txPr>
-        <c:crossAx val="-1219589712"/>
+        <c:crossAx val="-1295418592"/>
         <c:crosses val="autoZero"/>
         <c:crossBetween val="between"/>
       </c:valAx>
@@ -2741,11 +2741,11 @@
           <c:showBubbleSize val="0"/>
         </c:dLbls>
         <c:smooth val="0"/>
-        <c:axId val="-1220600112"/>
-        <c:axId val="-1220597792"/>
+        <c:axId val="-1222279856"/>
+        <c:axId val="-1222543120"/>
       </c:lineChart>
       <c:catAx>
-        <c:axId val="-1220600112"/>
+        <c:axId val="-1222279856"/>
         <c:scaling>
           <c:orientation val="minMax"/>
         </c:scaling>
@@ -2788,7 +2788,7 @@
             <a:endParaRPr lang="en-US"/>
           </a:p>
         </c:txPr>
-        <c:crossAx val="-1220597792"/>
+        <c:crossAx val="-1222543120"/>
         <c:crosses val="autoZero"/>
         <c:auto val="1"/>
         <c:lblAlgn val="ctr"/>
@@ -2796,7 +2796,7 @@
         <c:noMultiLvlLbl val="0"/>
       </c:catAx>
       <c:valAx>
-        <c:axId val="-1220597792"/>
+        <c:axId val="-1222543120"/>
         <c:scaling>
           <c:orientation val="minMax"/>
         </c:scaling>
@@ -2833,7 +2833,7 @@
             <a:endParaRPr lang="en-US"/>
           </a:p>
         </c:txPr>
-        <c:crossAx val="-1220600112"/>
+        <c:crossAx val="-1222279856"/>
         <c:crosses val="autoZero"/>
         <c:crossBetween val="between"/>
       </c:valAx>
@@ -3032,11 +3032,11 @@
           <c:showBubbleSize val="0"/>
         </c:dLbls>
         <c:smooth val="0"/>
-        <c:axId val="-1220576336"/>
-        <c:axId val="-1220574016"/>
+        <c:axId val="-1221545840"/>
+        <c:axId val="-1221127024"/>
       </c:lineChart>
       <c:catAx>
-        <c:axId val="-1220576336"/>
+        <c:axId val="-1221545840"/>
         <c:scaling>
           <c:orientation val="minMax"/>
         </c:scaling>
@@ -3079,7 +3079,7 @@
             <a:endParaRPr lang="en-US"/>
           </a:p>
         </c:txPr>
-        <c:crossAx val="-1220574016"/>
+        <c:crossAx val="-1221127024"/>
         <c:crosses val="autoZero"/>
         <c:auto val="1"/>
         <c:lblAlgn val="ctr"/>
@@ -3087,7 +3087,7 @@
         <c:noMultiLvlLbl val="0"/>
       </c:catAx>
       <c:valAx>
-        <c:axId val="-1220574016"/>
+        <c:axId val="-1221127024"/>
         <c:scaling>
           <c:orientation val="minMax"/>
         </c:scaling>
@@ -3123,7 +3123,7 @@
             <a:endParaRPr lang="en-US"/>
           </a:p>
         </c:txPr>
-        <c:crossAx val="-1220576336"/>
+        <c:crossAx val="-1221545840"/>
         <c:crosses val="autoZero"/>
         <c:crossBetween val="between"/>
       </c:valAx>
@@ -3318,11 +3318,11 @@
           <c:showBubbleSize val="0"/>
         </c:dLbls>
         <c:smooth val="0"/>
-        <c:axId val="-1221695024"/>
-        <c:axId val="-1221702464"/>
+        <c:axId val="-1222309952"/>
+        <c:axId val="-1222307904"/>
       </c:lineChart>
       <c:catAx>
-        <c:axId val="-1221695024"/>
+        <c:axId val="-1222309952"/>
         <c:scaling>
           <c:orientation val="minMax"/>
         </c:scaling>
@@ -3365,7 +3365,7 @@
             <a:endParaRPr lang="en-US"/>
           </a:p>
         </c:txPr>
-        <c:crossAx val="-1221702464"/>
+        <c:crossAx val="-1222307904"/>
         <c:crosses val="autoZero"/>
         <c:auto val="1"/>
         <c:lblAlgn val="ctr"/>
@@ -3373,7 +3373,7 @@
         <c:noMultiLvlLbl val="0"/>
       </c:catAx>
       <c:valAx>
-        <c:axId val="-1221702464"/>
+        <c:axId val="-1222307904"/>
         <c:scaling>
           <c:orientation val="minMax"/>
         </c:scaling>
@@ -3410,7 +3410,7 @@
             <a:endParaRPr lang="en-US"/>
           </a:p>
         </c:txPr>
-        <c:crossAx val="-1221695024"/>
+        <c:crossAx val="-1222309952"/>
         <c:crosses val="autoZero"/>
         <c:crossBetween val="between"/>
       </c:valAx>
@@ -3605,11 +3605,11 @@
           <c:showBubbleSize val="0"/>
         </c:dLbls>
         <c:smooth val="0"/>
-        <c:axId val="-1220560736"/>
-        <c:axId val="-1220628976"/>
+        <c:axId val="-1222181136"/>
+        <c:axId val="-1222179088"/>
       </c:lineChart>
       <c:catAx>
-        <c:axId val="-1220560736"/>
+        <c:axId val="-1222181136"/>
         <c:scaling>
           <c:orientation val="minMax"/>
         </c:scaling>
@@ -3652,7 +3652,7 @@
             <a:endParaRPr lang="en-US"/>
           </a:p>
         </c:txPr>
-        <c:crossAx val="-1220628976"/>
+        <c:crossAx val="-1222179088"/>
         <c:crosses val="autoZero"/>
         <c:auto val="1"/>
         <c:lblAlgn val="ctr"/>
@@ -3660,7 +3660,7 @@
         <c:noMultiLvlLbl val="0"/>
       </c:catAx>
       <c:valAx>
-        <c:axId val="-1220628976"/>
+        <c:axId val="-1222179088"/>
         <c:scaling>
           <c:orientation val="minMax"/>
         </c:scaling>
@@ -3696,7 +3696,7 @@
             <a:endParaRPr lang="en-US"/>
           </a:p>
         </c:txPr>
-        <c:crossAx val="-1220560736"/>
+        <c:crossAx val="-1222181136"/>
         <c:crosses val="autoZero"/>
         <c:crossBetween val="between"/>
       </c:valAx>
@@ -3895,11 +3895,11 @@
           <c:showBubbleSize val="0"/>
         </c:dLbls>
         <c:smooth val="0"/>
-        <c:axId val="-1220715360"/>
-        <c:axId val="-1220713040"/>
+        <c:axId val="-1222232336"/>
+        <c:axId val="-1222230016"/>
       </c:lineChart>
       <c:catAx>
-        <c:axId val="-1220715360"/>
+        <c:axId val="-1222232336"/>
         <c:scaling>
           <c:orientation val="minMax"/>
         </c:scaling>
@@ -3942,7 +3942,7 @@
             <a:endParaRPr lang="en-US"/>
           </a:p>
         </c:txPr>
-        <c:crossAx val="-1220713040"/>
+        <c:crossAx val="-1222230016"/>
         <c:crosses val="autoZero"/>
         <c:auto val="1"/>
         <c:lblAlgn val="ctr"/>
@@ -3950,7 +3950,7 @@
         <c:noMultiLvlLbl val="0"/>
       </c:catAx>
       <c:valAx>
-        <c:axId val="-1220713040"/>
+        <c:axId val="-1222230016"/>
         <c:scaling>
           <c:orientation val="minMax"/>
         </c:scaling>
@@ -3987,7 +3987,7 @@
             <a:endParaRPr lang="en-US"/>
           </a:p>
         </c:txPr>
-        <c:crossAx val="-1220715360"/>
+        <c:crossAx val="-1222232336"/>
         <c:crosses val="autoZero"/>
         <c:crossBetween val="between"/>
       </c:valAx>
@@ -26158,7 +26158,7 @@
           <p:cNvPr id="13" name="Content Placeholder 2">
             <a:extLst>
               <a:ext uri="{FF2B5EF4-FFF2-40B4-BE49-F238E27FC236}">
-                <a16:creationId xmlns="" xmlns:a16="http://schemas.microsoft.com/office/drawing/2014/main" id="{7CE76DCB-6D06-4FCF-8C85-021414B0A6EA}"/>
+                <a16:creationId xmlns:a16="http://schemas.microsoft.com/office/drawing/2014/main" xmlns="" id="{7CE76DCB-6D06-4FCF-8C85-021414B0A6EA}"/>
               </a:ext>
             </a:extLst>
           </p:cNvPr>
@@ -26533,7 +26533,7 @@
           <p:cNvPr id="6" name="Content Placeholder 2">
             <a:extLst>
               <a:ext uri="{FF2B5EF4-FFF2-40B4-BE49-F238E27FC236}">
-                <a16:creationId xmlns:a16="http://schemas.microsoft.com/office/drawing/2014/main" xmlns="" id="{7CE76DCB-6D06-4FCF-8C85-021414B0A6EA}"/>
+                <a16:creationId xmlns="" xmlns:a16="http://schemas.microsoft.com/office/drawing/2014/main" id="{7CE76DCB-6D06-4FCF-8C85-021414B0A6EA}"/>
               </a:ext>
             </a:extLst>
           </p:cNvPr>
@@ -29389,7 +29389,7 @@
           <p:cNvPr id="10" name="Content Placeholder 2">
             <a:extLst>
               <a:ext uri="{FF2B5EF4-FFF2-40B4-BE49-F238E27FC236}">
-                <a16:creationId xmlns="" xmlns:a16="http://schemas.microsoft.com/office/drawing/2014/main" id="{7CE76DCB-6D06-4FCF-8C85-021414B0A6EA}"/>
+                <a16:creationId xmlns:a16="http://schemas.microsoft.com/office/drawing/2014/main" xmlns="" id="{7CE76DCB-6D06-4FCF-8C85-021414B0A6EA}"/>
               </a:ext>
             </a:extLst>
           </p:cNvPr>
@@ -29673,7 +29673,7 @@
           <p:cNvPr id="11" name="Content Placeholder 2">
             <a:extLst>
               <a:ext uri="{FF2B5EF4-FFF2-40B4-BE49-F238E27FC236}">
-                <a16:creationId xmlns="" xmlns:a16="http://schemas.microsoft.com/office/drawing/2014/main" id="{7CE76DCB-6D06-4FCF-8C85-021414B0A6EA}"/>
+                <a16:creationId xmlns:a16="http://schemas.microsoft.com/office/drawing/2014/main" xmlns="" id="{7CE76DCB-6D06-4FCF-8C85-021414B0A6EA}"/>
               </a:ext>
             </a:extLst>
           </p:cNvPr>
@@ -29915,15 +29915,7 @@
                 <a:ea typeface="Book Antiqua" charset="0"/>
                 <a:cs typeface="Book Antiqua" charset="0"/>
               </a:rPr>
-              <a:t>Running </a:t>
-            </a:r>
-            <a:r>
-              <a:rPr lang="en-US" sz="2400" smtClean="0">
-                <a:latin typeface="Book Antiqua" charset="0"/>
-                <a:ea typeface="Book Antiqua" charset="0"/>
-                <a:cs typeface="Book Antiqua" charset="0"/>
-              </a:rPr>
-              <a:t>time on </a:t>
+              <a:t>Running time on </a:t>
             </a:r>
             <a:r>
               <a:rPr lang="en-US" sz="2400" dirty="0" smtClean="0">
@@ -38946,7 +38938,23 @@
                 <a:ea typeface="Book Antiqua" charset="0"/>
                 <a:cs typeface="Book Antiqua" charset="0"/>
               </a:rPr>
-              <a:t>Train Error Rate: </a:t>
+              <a:t>Train </a:t>
+            </a:r>
+            <a:r>
+              <a:rPr lang="en-CA" b="1" smtClean="0">
+                <a:latin typeface="Book Antiqua" charset="0"/>
+                <a:ea typeface="Book Antiqua" charset="0"/>
+                <a:cs typeface="Book Antiqua" charset="0"/>
+              </a:rPr>
+              <a:t>Error </a:t>
+            </a:r>
+            <a:r>
+              <a:rPr lang="en-CA" b="1" smtClean="0">
+                <a:latin typeface="Book Antiqua" charset="0"/>
+                <a:ea typeface="Book Antiqua" charset="0"/>
+                <a:cs typeface="Book Antiqua" charset="0"/>
+              </a:rPr>
+              <a:t>Rate (CV Error rate) : </a:t>
             </a:r>
             <a:r>
               <a:rPr lang="hr-HR" dirty="0" smtClean="0">

</xml_diff>

<commit_message>
final model running times
</commit_message>
<xml_diff>
--- a/grp7_V2.pptx
+++ b/grp7_V2.pptx
@@ -433,11 +433,11 @@
           <c:showBubbleSize val="0"/>
         </c:dLbls>
         <c:smooth val="0"/>
-        <c:axId val="-1217916032"/>
-        <c:axId val="-1222451568"/>
+        <c:axId val="-1222278304"/>
+        <c:axId val="-1217780160"/>
       </c:lineChart>
       <c:catAx>
-        <c:axId val="-1217916032"/>
+        <c:axId val="-1222278304"/>
         <c:scaling>
           <c:orientation val="minMax"/>
         </c:scaling>
@@ -480,7 +480,7 @@
             <a:endParaRPr lang="en-US"/>
           </a:p>
         </c:txPr>
-        <c:crossAx val="-1222451568"/>
+        <c:crossAx val="-1217780160"/>
         <c:crosses val="autoZero"/>
         <c:auto val="1"/>
         <c:lblAlgn val="ctr"/>
@@ -488,7 +488,7 @@
         <c:noMultiLvlLbl val="0"/>
       </c:catAx>
       <c:valAx>
-        <c:axId val="-1222451568"/>
+        <c:axId val="-1217780160"/>
         <c:scaling>
           <c:orientation val="minMax"/>
         </c:scaling>
@@ -525,7 +525,7 @@
             <a:endParaRPr lang="en-US"/>
           </a:p>
         </c:txPr>
-        <c:crossAx val="-1217916032"/>
+        <c:crossAx val="-1222278304"/>
         <c:crosses val="autoZero"/>
         <c:crossBetween val="between"/>
       </c:valAx>
@@ -724,11 +724,11 @@
           <c:showBubbleSize val="0"/>
         </c:dLbls>
         <c:smooth val="0"/>
-        <c:axId val="-1222329760"/>
-        <c:axId val="-1222327440"/>
+        <c:axId val="-1219695920"/>
+        <c:axId val="-1219693600"/>
       </c:lineChart>
       <c:catAx>
-        <c:axId val="-1222329760"/>
+        <c:axId val="-1219695920"/>
         <c:scaling>
           <c:orientation val="minMax"/>
         </c:scaling>
@@ -771,7 +771,7 @@
             <a:endParaRPr lang="en-US"/>
           </a:p>
         </c:txPr>
-        <c:crossAx val="-1222327440"/>
+        <c:crossAx val="-1219693600"/>
         <c:crosses val="autoZero"/>
         <c:auto val="1"/>
         <c:lblAlgn val="ctr"/>
@@ -779,7 +779,7 @@
         <c:noMultiLvlLbl val="0"/>
       </c:catAx>
       <c:valAx>
-        <c:axId val="-1222327440"/>
+        <c:axId val="-1219693600"/>
         <c:scaling>
           <c:orientation val="minMax"/>
         </c:scaling>
@@ -816,7 +816,7 @@
             <a:endParaRPr lang="en-US"/>
           </a:p>
         </c:txPr>
-        <c:crossAx val="-1222329760"/>
+        <c:crossAx val="-1219695920"/>
         <c:crosses val="autoZero"/>
         <c:crossBetween val="between"/>
       </c:valAx>
@@ -1122,11 +1122,11 @@
           <c:showBubbleSize val="0"/>
         </c:dLbls>
         <c:smooth val="0"/>
-        <c:axId val="-1217668032"/>
-        <c:axId val="-1217665984"/>
+        <c:axId val="-1219543904"/>
+        <c:axId val="-1220798640"/>
       </c:lineChart>
       <c:catAx>
-        <c:axId val="-1217668032"/>
+        <c:axId val="-1219543904"/>
         <c:scaling>
           <c:orientation val="minMax"/>
         </c:scaling>
@@ -1169,7 +1169,7 @@
             <a:endParaRPr lang="en-US"/>
           </a:p>
         </c:txPr>
-        <c:crossAx val="-1217665984"/>
+        <c:crossAx val="-1220798640"/>
         <c:crosses val="autoZero"/>
         <c:auto val="1"/>
         <c:lblAlgn val="ctr"/>
@@ -1177,7 +1177,7 @@
         <c:noMultiLvlLbl val="0"/>
       </c:catAx>
       <c:valAx>
-        <c:axId val="-1217665984"/>
+        <c:axId val="-1220798640"/>
         <c:scaling>
           <c:orientation val="minMax"/>
         </c:scaling>
@@ -1214,7 +1214,7 @@
             <a:endParaRPr lang="en-US"/>
           </a:p>
         </c:txPr>
-        <c:crossAx val="-1217668032"/>
+        <c:crossAx val="-1219543904"/>
         <c:crosses val="autoZero"/>
         <c:crossBetween val="between"/>
       </c:valAx>
@@ -1547,11 +1547,11 @@
           <c:showBubbleSize val="0"/>
         </c:dLbls>
         <c:smooth val="0"/>
-        <c:axId val="-1292945552"/>
-        <c:axId val="-1293619040"/>
+        <c:axId val="-1221377056"/>
+        <c:axId val="-1221374736"/>
       </c:lineChart>
       <c:catAx>
-        <c:axId val="-1292945552"/>
+        <c:axId val="-1221377056"/>
         <c:scaling>
           <c:orientation val="minMax"/>
         </c:scaling>
@@ -1594,7 +1594,7 @@
             <a:endParaRPr lang="en-US"/>
           </a:p>
         </c:txPr>
-        <c:crossAx val="-1293619040"/>
+        <c:crossAx val="-1221374736"/>
         <c:crosses val="autoZero"/>
         <c:auto val="1"/>
         <c:lblAlgn val="ctr"/>
@@ -1602,7 +1602,7 @@
         <c:noMultiLvlLbl val="0"/>
       </c:catAx>
       <c:valAx>
-        <c:axId val="-1293619040"/>
+        <c:axId val="-1221374736"/>
         <c:scaling>
           <c:orientation val="minMax"/>
         </c:scaling>
@@ -1639,7 +1639,7 @@
             <a:endParaRPr lang="en-US"/>
           </a:p>
         </c:txPr>
-        <c:crossAx val="-1292945552"/>
+        <c:crossAx val="-1221377056"/>
         <c:crosses val="autoZero"/>
         <c:crossBetween val="between"/>
       </c:valAx>
@@ -1869,11 +1869,11 @@
           <c:showBubbleSize val="0"/>
         </c:dLbls>
         <c:smooth val="0"/>
-        <c:axId val="-1219362768"/>
-        <c:axId val="-1219360448"/>
+        <c:axId val="-1222314688"/>
+        <c:axId val="-1222330800"/>
       </c:lineChart>
       <c:catAx>
-        <c:axId val="-1219362768"/>
+        <c:axId val="-1222314688"/>
         <c:scaling>
           <c:orientation val="minMax"/>
         </c:scaling>
@@ -1916,7 +1916,7 @@
             <a:endParaRPr lang="en-US"/>
           </a:p>
         </c:txPr>
-        <c:crossAx val="-1219360448"/>
+        <c:crossAx val="-1222330800"/>
         <c:crosses val="autoZero"/>
         <c:auto val="1"/>
         <c:lblAlgn val="ctr"/>
@@ -1924,7 +1924,7 @@
         <c:noMultiLvlLbl val="0"/>
       </c:catAx>
       <c:valAx>
-        <c:axId val="-1219360448"/>
+        <c:axId val="-1222330800"/>
         <c:scaling>
           <c:orientation val="minMax"/>
         </c:scaling>
@@ -1961,7 +1961,7 @@
             <a:endParaRPr lang="en-US"/>
           </a:p>
         </c:txPr>
-        <c:crossAx val="-1219362768"/>
+        <c:crossAx val="-1222314688"/>
         <c:crosses val="autoZero"/>
         <c:crossBetween val="between"/>
       </c:valAx>
@@ -2160,11 +2160,11 @@
           <c:showBubbleSize val="0"/>
         </c:dLbls>
         <c:smooth val="0"/>
-        <c:axId val="-1221865040"/>
-        <c:axId val="-1221855584"/>
+        <c:axId val="-1204393216"/>
+        <c:axId val="-1204390896"/>
       </c:lineChart>
       <c:catAx>
-        <c:axId val="-1221865040"/>
+        <c:axId val="-1204393216"/>
         <c:scaling>
           <c:orientation val="minMax"/>
         </c:scaling>
@@ -2207,7 +2207,7 @@
             <a:endParaRPr lang="en-US"/>
           </a:p>
         </c:txPr>
-        <c:crossAx val="-1221855584"/>
+        <c:crossAx val="-1204390896"/>
         <c:crosses val="autoZero"/>
         <c:auto val="1"/>
         <c:lblAlgn val="ctr"/>
@@ -2215,7 +2215,7 @@
         <c:noMultiLvlLbl val="0"/>
       </c:catAx>
       <c:valAx>
-        <c:axId val="-1221855584"/>
+        <c:axId val="-1204390896"/>
         <c:scaling>
           <c:orientation val="minMax"/>
         </c:scaling>
@@ -2251,7 +2251,7 @@
             <a:endParaRPr lang="en-US"/>
           </a:p>
         </c:txPr>
-        <c:crossAx val="-1221865040"/>
+        <c:crossAx val="-1204393216"/>
         <c:crosses val="autoZero"/>
         <c:crossBetween val="between"/>
       </c:valAx>
@@ -2450,11 +2450,11 @@
           <c:showBubbleSize val="0"/>
         </c:dLbls>
         <c:smooth val="0"/>
-        <c:axId val="-1295418592"/>
-        <c:axId val="-1222119088"/>
+        <c:axId val="-1217942288"/>
+        <c:axId val="-1222513792"/>
       </c:lineChart>
       <c:catAx>
-        <c:axId val="-1295418592"/>
+        <c:axId val="-1217942288"/>
         <c:scaling>
           <c:orientation val="minMax"/>
         </c:scaling>
@@ -2497,7 +2497,7 @@
             <a:endParaRPr lang="en-US"/>
           </a:p>
         </c:txPr>
-        <c:crossAx val="-1222119088"/>
+        <c:crossAx val="-1222513792"/>
         <c:crosses val="autoZero"/>
         <c:auto val="1"/>
         <c:lblAlgn val="ctr"/>
@@ -2505,7 +2505,7 @@
         <c:noMultiLvlLbl val="0"/>
       </c:catAx>
       <c:valAx>
-        <c:axId val="-1222119088"/>
+        <c:axId val="-1222513792"/>
         <c:scaling>
           <c:orientation val="minMax"/>
         </c:scaling>
@@ -2542,7 +2542,7 @@
             <a:endParaRPr lang="en-US"/>
           </a:p>
         </c:txPr>
-        <c:crossAx val="-1295418592"/>
+        <c:crossAx val="-1217942288"/>
         <c:crosses val="autoZero"/>
         <c:crossBetween val="between"/>
       </c:valAx>
@@ -2741,11 +2741,11 @@
           <c:showBubbleSize val="0"/>
         </c:dLbls>
         <c:smooth val="0"/>
-        <c:axId val="-1222279856"/>
-        <c:axId val="-1222543120"/>
+        <c:axId val="-1221705008"/>
+        <c:axId val="-1256330816"/>
       </c:lineChart>
       <c:catAx>
-        <c:axId val="-1222279856"/>
+        <c:axId val="-1221705008"/>
         <c:scaling>
           <c:orientation val="minMax"/>
         </c:scaling>
@@ -2788,7 +2788,7 @@
             <a:endParaRPr lang="en-US"/>
           </a:p>
         </c:txPr>
-        <c:crossAx val="-1222543120"/>
+        <c:crossAx val="-1256330816"/>
         <c:crosses val="autoZero"/>
         <c:auto val="1"/>
         <c:lblAlgn val="ctr"/>
@@ -2796,7 +2796,7 @@
         <c:noMultiLvlLbl val="0"/>
       </c:catAx>
       <c:valAx>
-        <c:axId val="-1222543120"/>
+        <c:axId val="-1256330816"/>
         <c:scaling>
           <c:orientation val="minMax"/>
         </c:scaling>
@@ -2833,7 +2833,7 @@
             <a:endParaRPr lang="en-US"/>
           </a:p>
         </c:txPr>
-        <c:crossAx val="-1222279856"/>
+        <c:crossAx val="-1221705008"/>
         <c:crosses val="autoZero"/>
         <c:crossBetween val="between"/>
       </c:valAx>
@@ -3032,11 +3032,11 @@
           <c:showBubbleSize val="0"/>
         </c:dLbls>
         <c:smooth val="0"/>
-        <c:axId val="-1221545840"/>
-        <c:axId val="-1221127024"/>
+        <c:axId val="-1217907056"/>
+        <c:axId val="-1222444544"/>
       </c:lineChart>
       <c:catAx>
-        <c:axId val="-1221545840"/>
+        <c:axId val="-1217907056"/>
         <c:scaling>
           <c:orientation val="minMax"/>
         </c:scaling>
@@ -3079,7 +3079,7 @@
             <a:endParaRPr lang="en-US"/>
           </a:p>
         </c:txPr>
-        <c:crossAx val="-1221127024"/>
+        <c:crossAx val="-1222444544"/>
         <c:crosses val="autoZero"/>
         <c:auto val="1"/>
         <c:lblAlgn val="ctr"/>
@@ -3087,7 +3087,7 @@
         <c:noMultiLvlLbl val="0"/>
       </c:catAx>
       <c:valAx>
-        <c:axId val="-1221127024"/>
+        <c:axId val="-1222444544"/>
         <c:scaling>
           <c:orientation val="minMax"/>
         </c:scaling>
@@ -3123,7 +3123,7 @@
             <a:endParaRPr lang="en-US"/>
           </a:p>
         </c:txPr>
-        <c:crossAx val="-1221545840"/>
+        <c:crossAx val="-1217907056"/>
         <c:crosses val="autoZero"/>
         <c:crossBetween val="between"/>
       </c:valAx>
@@ -3318,11 +3318,11 @@
           <c:showBubbleSize val="0"/>
         </c:dLbls>
         <c:smooth val="0"/>
-        <c:axId val="-1222309952"/>
-        <c:axId val="-1222307904"/>
+        <c:axId val="-1221965632"/>
+        <c:axId val="-1221963312"/>
       </c:lineChart>
       <c:catAx>
-        <c:axId val="-1222309952"/>
+        <c:axId val="-1221965632"/>
         <c:scaling>
           <c:orientation val="minMax"/>
         </c:scaling>
@@ -3365,7 +3365,7 @@
             <a:endParaRPr lang="en-US"/>
           </a:p>
         </c:txPr>
-        <c:crossAx val="-1222307904"/>
+        <c:crossAx val="-1221963312"/>
         <c:crosses val="autoZero"/>
         <c:auto val="1"/>
         <c:lblAlgn val="ctr"/>
@@ -3373,7 +3373,7 @@
         <c:noMultiLvlLbl val="0"/>
       </c:catAx>
       <c:valAx>
-        <c:axId val="-1222307904"/>
+        <c:axId val="-1221963312"/>
         <c:scaling>
           <c:orientation val="minMax"/>
         </c:scaling>
@@ -3410,7 +3410,7 @@
             <a:endParaRPr lang="en-US"/>
           </a:p>
         </c:txPr>
-        <c:crossAx val="-1222309952"/>
+        <c:crossAx val="-1221965632"/>
         <c:crosses val="autoZero"/>
         <c:crossBetween val="between"/>
       </c:valAx>
@@ -3605,11 +3605,11 @@
           <c:showBubbleSize val="0"/>
         </c:dLbls>
         <c:smooth val="0"/>
-        <c:axId val="-1222181136"/>
-        <c:axId val="-1222179088"/>
+        <c:axId val="-1217650656"/>
+        <c:axId val="-1217648336"/>
       </c:lineChart>
       <c:catAx>
-        <c:axId val="-1222181136"/>
+        <c:axId val="-1217650656"/>
         <c:scaling>
           <c:orientation val="minMax"/>
         </c:scaling>
@@ -3652,7 +3652,7 @@
             <a:endParaRPr lang="en-US"/>
           </a:p>
         </c:txPr>
-        <c:crossAx val="-1222179088"/>
+        <c:crossAx val="-1217648336"/>
         <c:crosses val="autoZero"/>
         <c:auto val="1"/>
         <c:lblAlgn val="ctr"/>
@@ -3660,7 +3660,7 @@
         <c:noMultiLvlLbl val="0"/>
       </c:catAx>
       <c:valAx>
-        <c:axId val="-1222179088"/>
+        <c:axId val="-1217648336"/>
         <c:scaling>
           <c:orientation val="minMax"/>
         </c:scaling>
@@ -3696,7 +3696,7 @@
             <a:endParaRPr lang="en-US"/>
           </a:p>
         </c:txPr>
-        <c:crossAx val="-1222181136"/>
+        <c:crossAx val="-1217650656"/>
         <c:crosses val="autoZero"/>
         <c:crossBetween val="between"/>
       </c:valAx>
@@ -3895,11 +3895,11 @@
           <c:showBubbleSize val="0"/>
         </c:dLbls>
         <c:smooth val="0"/>
-        <c:axId val="-1222232336"/>
-        <c:axId val="-1222230016"/>
+        <c:axId val="-1219722992"/>
+        <c:axId val="-1204812304"/>
       </c:lineChart>
       <c:catAx>
-        <c:axId val="-1222232336"/>
+        <c:axId val="-1219722992"/>
         <c:scaling>
           <c:orientation val="minMax"/>
         </c:scaling>
@@ -3942,7 +3942,7 @@
             <a:endParaRPr lang="en-US"/>
           </a:p>
         </c:txPr>
-        <c:crossAx val="-1222230016"/>
+        <c:crossAx val="-1204812304"/>
         <c:crosses val="autoZero"/>
         <c:auto val="1"/>
         <c:lblAlgn val="ctr"/>
@@ -3950,7 +3950,7 @@
         <c:noMultiLvlLbl val="0"/>
       </c:catAx>
       <c:valAx>
-        <c:axId val="-1222230016"/>
+        <c:axId val="-1204812304"/>
         <c:scaling>
           <c:orientation val="minMax"/>
         </c:scaling>
@@ -3987,7 +3987,7 @@
             <a:endParaRPr lang="en-US"/>
           </a:p>
         </c:txPr>
-        <c:crossAx val="-1222232336"/>
+        <c:crossAx val="-1219722992"/>
         <c:crosses val="autoZero"/>
         <c:crossBetween val="between"/>
       </c:valAx>
@@ -26158,7 +26158,7 @@
           <p:cNvPr id="13" name="Content Placeholder 2">
             <a:extLst>
               <a:ext uri="{FF2B5EF4-FFF2-40B4-BE49-F238E27FC236}">
-                <a16:creationId xmlns:a16="http://schemas.microsoft.com/office/drawing/2014/main" xmlns="" id="{7CE76DCB-6D06-4FCF-8C85-021414B0A6EA}"/>
+                <a16:creationId xmlns="" xmlns:a16="http://schemas.microsoft.com/office/drawing/2014/main" id="{7CE76DCB-6D06-4FCF-8C85-021414B0A6EA}"/>
               </a:ext>
             </a:extLst>
           </p:cNvPr>
@@ -26533,7 +26533,7 @@
           <p:cNvPr id="6" name="Content Placeholder 2">
             <a:extLst>
               <a:ext uri="{FF2B5EF4-FFF2-40B4-BE49-F238E27FC236}">
-                <a16:creationId xmlns="" xmlns:a16="http://schemas.microsoft.com/office/drawing/2014/main" id="{7CE76DCB-6D06-4FCF-8C85-021414B0A6EA}"/>
+                <a16:creationId xmlns:a16="http://schemas.microsoft.com/office/drawing/2014/main" xmlns="" id="{7CE76DCB-6D06-4FCF-8C85-021414B0A6EA}"/>
               </a:ext>
             </a:extLst>
           </p:cNvPr>
@@ -26561,13 +26561,31 @@
               <a:rPr lang="en-CA" dirty="0">
                 <a:latin typeface="Book Antiqua" panose="02040602050305030304" pitchFamily="18" charset="0"/>
               </a:rPr>
-              <a:t>Given the new testing data of 3000 images, the results of our proposed Final Model are below.</a:t>
+              <a:t>Given the new testing data of 3000 images, the results of our proposed Final </a:t>
+            </a:r>
+            <a:r>
+              <a:rPr lang="en-CA" dirty="0" smtClean="0">
+                <a:latin typeface="Book Antiqua" panose="02040602050305030304" pitchFamily="18" charset="0"/>
+              </a:rPr>
+              <a:t>Model in terms of running time </a:t>
+            </a:r>
+            <a:r>
+              <a:rPr lang="en-CA" dirty="0">
+                <a:latin typeface="Book Antiqua" panose="02040602050305030304" pitchFamily="18" charset="0"/>
+              </a:rPr>
+              <a:t>are below.</a:t>
             </a:r>
           </a:p>
           <a:p>
             <a:pPr marL="0" indent="0">
               <a:buNone/>
             </a:pPr>
+            <a:r>
+              <a:rPr lang="en-CA" dirty="0" smtClean="0">
+                <a:latin typeface="Book Antiqua" panose="02040602050305030304" pitchFamily="18" charset="0"/>
+              </a:rPr>
+              <a:t>Baseline:</a:t>
+            </a:r>
             <a:endParaRPr lang="en-CA" dirty="0">
               <a:latin typeface="Book Antiqua" panose="02040602050305030304" pitchFamily="18" charset="0"/>
             </a:endParaRPr>
@@ -26581,17 +26599,40 @@
               <a:buChar char="-"/>
             </a:pPr>
             <a:r>
+              <a:rPr lang="en-CA" dirty="0" smtClean="0">
+                <a:latin typeface="Book Antiqua" panose="02040602050305030304" pitchFamily="18" charset="0"/>
+              </a:rPr>
+              <a:t>Running </a:t>
+            </a:r>
+            <a:r>
               <a:rPr lang="en-CA" dirty="0">
                 <a:latin typeface="Book Antiqua" panose="02040602050305030304" pitchFamily="18" charset="0"/>
               </a:rPr>
-              <a:t>Accuracy:</a:t>
+              <a:t>Time: </a:t>
+            </a:r>
+            <a:r>
+              <a:rPr lang="en-CA" dirty="0" smtClean="0">
+                <a:latin typeface="Book Antiqua" panose="02040602050305030304" pitchFamily="18" charset="0"/>
+              </a:rPr>
+              <a:t>- 0.903 seconds</a:t>
+            </a:r>
+            <a:endParaRPr lang="en-CA" dirty="0">
+              <a:latin typeface="Book Antiqua" panose="02040602050305030304" pitchFamily="18" charset="0"/>
+            </a:endParaRPr>
+          </a:p>
+          <a:p>
+            <a:pPr marL="0" indent="0">
+              <a:buNone/>
+            </a:pPr>
+            <a:r>
+              <a:rPr lang="en-CA" dirty="0" smtClean="0">
+                <a:latin typeface="Book Antiqua" panose="02040602050305030304" pitchFamily="18" charset="0"/>
+              </a:rPr>
+              <a:t>Advanced:</a:t>
             </a:r>
           </a:p>
           <a:p>
-            <a:pPr>
-              <a:lnSpc>
-                <a:spcPct val="100000"/>
-              </a:lnSpc>
+            <a:pPr lvl="0">
               <a:buFontTx/>
               <a:buChar char="-"/>
             </a:pPr>
@@ -26601,6 +26642,15 @@
               </a:rPr>
               <a:t>Running Time: </a:t>
             </a:r>
+            <a:r>
+              <a:rPr lang="en-CA" dirty="0" smtClean="0">
+                <a:latin typeface="Book Antiqua" panose="02040602050305030304" pitchFamily="18" charset="0"/>
+              </a:rPr>
+              <a:t>- 0.765 seconds </a:t>
+            </a:r>
+            <a:endParaRPr lang="en-CA" dirty="0" smtClean="0">
+              <a:latin typeface="Book Antiqua" panose="02040602050305030304" pitchFamily="18" charset="0"/>
+            </a:endParaRPr>
           </a:p>
           <a:p>
             <a:pPr marL="0" indent="0">
@@ -29389,7 +29439,7 @@
           <p:cNvPr id="10" name="Content Placeholder 2">
             <a:extLst>
               <a:ext uri="{FF2B5EF4-FFF2-40B4-BE49-F238E27FC236}">
-                <a16:creationId xmlns:a16="http://schemas.microsoft.com/office/drawing/2014/main" xmlns="" id="{7CE76DCB-6D06-4FCF-8C85-021414B0A6EA}"/>
+                <a16:creationId xmlns="" xmlns:a16="http://schemas.microsoft.com/office/drawing/2014/main" id="{7CE76DCB-6D06-4FCF-8C85-021414B0A6EA}"/>
               </a:ext>
             </a:extLst>
           </p:cNvPr>
@@ -29673,7 +29723,7 @@
           <p:cNvPr id="11" name="Content Placeholder 2">
             <a:extLst>
               <a:ext uri="{FF2B5EF4-FFF2-40B4-BE49-F238E27FC236}">
-                <a16:creationId xmlns:a16="http://schemas.microsoft.com/office/drawing/2014/main" xmlns="" id="{7CE76DCB-6D06-4FCF-8C85-021414B0A6EA}"/>
+                <a16:creationId xmlns="" xmlns:a16="http://schemas.microsoft.com/office/drawing/2014/main" id="{7CE76DCB-6D06-4FCF-8C85-021414B0A6EA}"/>
               </a:ext>
             </a:extLst>
           </p:cNvPr>
@@ -38946,15 +38996,7 @@
                 <a:ea typeface="Book Antiqua" charset="0"/>
                 <a:cs typeface="Book Antiqua" charset="0"/>
               </a:rPr>
-              <a:t>Error </a:t>
-            </a:r>
-            <a:r>
-              <a:rPr lang="en-CA" b="1" smtClean="0">
-                <a:latin typeface="Book Antiqua" charset="0"/>
-                <a:ea typeface="Book Antiqua" charset="0"/>
-                <a:cs typeface="Book Antiqua" charset="0"/>
-              </a:rPr>
-              <a:t>Rate (CV Error rate) : </a:t>
+              <a:t>Error Rate (CV Error rate) : </a:t>
             </a:r>
             <a:r>
               <a:rPr lang="hr-HR" dirty="0" smtClean="0">

</xml_diff>